<commit_message>
Added support for languages in pptx
</commit_message>
<xml_diff>
--- a/Templates/en/Modele.pptx
+++ b/Templates/en/Modele.pptx
@@ -294,16 +294,16 @@
               <c:strCache>
                 <c:ptCount val="4"/>
                 <c:pt idx="0">
-                  <c:v>Critique</c:v>
+                  <c:v>Critical</c:v>
                 </c:pt>
                 <c:pt idx="1">
-                  <c:v>Majeur</c:v>
+                  <c:v>Major</c:v>
                 </c:pt>
                 <c:pt idx="2">
                   <c:v>Important</c:v>
                 </c:pt>
                 <c:pt idx="3">
-                  <c:v>Mineur</c:v>
+                  <c:v>Minor</c:v>
                 </c:pt>
               </c:strCache>
             </c:strRef>
@@ -345,11 +345,11 @@
         </c:dLbls>
         <c:gapWidth val="100"/>
         <c:overlap val="-24"/>
-        <c:axId val="315996656"/>
-        <c:axId val="315996096"/>
+        <c:axId val="-506136064"/>
+        <c:axId val="-506136608"/>
       </c:barChart>
       <c:valAx>
-        <c:axId val="315996096"/>
+        <c:axId val="-506136608"/>
         <c:scaling>
           <c:orientation val="minMax"/>
           <c:max val="7"/>
@@ -395,16 +395,16 @@
                 <a:cs typeface="+mn-cs"/>
               </a:defRPr>
             </a:pPr>
-            <a:endParaRPr lang="en-US"/>
+            <a:endParaRPr lang="fr-FR"/>
           </a:p>
         </c:txPr>
-        <c:crossAx val="315996656"/>
+        <c:crossAx val="-506136064"/>
         <c:crosses val="autoZero"/>
         <c:crossBetween val="between"/>
         <c:majorUnit val="1"/>
       </c:valAx>
       <c:catAx>
-        <c:axId val="315996656"/>
+        <c:axId val="-506136064"/>
         <c:scaling>
           <c:orientation val="minMax"/>
         </c:scaling>
@@ -441,10 +441,10 @@
                 <a:cs typeface="+mn-cs"/>
               </a:defRPr>
             </a:pPr>
-            <a:endParaRPr lang="en-US"/>
+            <a:endParaRPr lang="fr-FR"/>
           </a:p>
         </c:txPr>
-        <c:crossAx val="315996096"/>
+        <c:crossAx val="-506136608"/>
         <c:crosses val="autoZero"/>
         <c:auto val="1"/>
         <c:lblAlgn val="ctr"/>
@@ -479,7 +479,7 @@
           <a:latin typeface="Calibri" panose="020F0502020204030204" pitchFamily="34" charset="0"/>
         </a:defRPr>
       </a:pPr>
-      <a:endParaRPr lang="en-US"/>
+      <a:endParaRPr lang="fr-FR"/>
     </a:p>
   </c:txPr>
   <c:externalData r:id="rId3">
@@ -990,7 +990,7 @@
           <p:cNvPr id="2" name="Espace réservé de l'en-tête 1">
             <a:extLst>
               <a:ext uri="{FF2B5EF4-FFF2-40B4-BE49-F238E27FC236}">
-                <a16:creationId xmlns:a16="http://schemas.microsoft.com/office/drawing/2014/main" xmlns="" id="{F4663C93-8A02-47A9-A89A-5465A40C92DB}"/>
+                <a16:creationId xmlns="" xmlns:a16="http://schemas.microsoft.com/office/drawing/2014/main" id="{F4663C93-8A02-47A9-A89A-5465A40C92DB}"/>
               </a:ext>
             </a:extLst>
           </p:cNvPr>
@@ -1027,7 +1027,7 @@
           <p:cNvPr id="3" name="Espace réservé de la date 2">
             <a:extLst>
               <a:ext uri="{FF2B5EF4-FFF2-40B4-BE49-F238E27FC236}">
-                <a16:creationId xmlns:a16="http://schemas.microsoft.com/office/drawing/2014/main" xmlns="" id="{A4AE427C-85BF-4A74-ABA5-9E279BC7083C}"/>
+                <a16:creationId xmlns="" xmlns:a16="http://schemas.microsoft.com/office/drawing/2014/main" id="{A4AE427C-85BF-4A74-ABA5-9E279BC7083C}"/>
               </a:ext>
             </a:extLst>
           </p:cNvPr>
@@ -1057,7 +1057,7 @@
           <a:p>
             <a:fld id="{D5FBA7C4-6295-42BF-A5BE-3AC44BBD7F68}" type="datetimeFigureOut">
               <a:rPr lang="fr-FR" smtClean="0"/>
-              <a:t>02/06/2020</a:t>
+              <a:t>19/07/2021</a:t>
             </a:fld>
             <a:endParaRPr lang="fr-FR" dirty="0"/>
           </a:p>
@@ -1068,7 +1068,7 @@
           <p:cNvPr id="4" name="Espace réservé du pied de page 3">
             <a:extLst>
               <a:ext uri="{FF2B5EF4-FFF2-40B4-BE49-F238E27FC236}">
-                <a16:creationId xmlns:a16="http://schemas.microsoft.com/office/drawing/2014/main" xmlns="" id="{ACEC27D1-F77E-4875-A9C8-491918AC3296}"/>
+                <a16:creationId xmlns="" xmlns:a16="http://schemas.microsoft.com/office/drawing/2014/main" id="{ACEC27D1-F77E-4875-A9C8-491918AC3296}"/>
               </a:ext>
             </a:extLst>
           </p:cNvPr>
@@ -1105,7 +1105,7 @@
           <p:cNvPr id="6" name="Espace réservé du numéro de diapositive 5">
             <a:extLst>
               <a:ext uri="{FF2B5EF4-FFF2-40B4-BE49-F238E27FC236}">
-                <a16:creationId xmlns:a16="http://schemas.microsoft.com/office/drawing/2014/main" xmlns="" id="{18FFBB53-3829-42C3-BAF2-EA837B8FA002}"/>
+                <a16:creationId xmlns="" xmlns:a16="http://schemas.microsoft.com/office/drawing/2014/main" id="{18FFBB53-3829-42C3-BAF2-EA837B8FA002}"/>
               </a:ext>
             </a:extLst>
           </p:cNvPr>
@@ -1234,7 +1234,7 @@
           <a:p>
             <a:fld id="{1BA69B28-F929-4A67-8508-9FD4AA31C66B}" type="datetimeFigureOut">
               <a:rPr lang="fr-FR" smtClean="0"/>
-              <a:t>02/06/2020</a:t>
+              <a:t>19/07/2021</a:t>
             </a:fld>
             <a:endParaRPr lang="fr-FR" dirty="0"/>
           </a:p>
@@ -1523,7 +1523,7 @@
           <p:cNvPr id="2" name="Titre 1">
             <a:extLst>
               <a:ext uri="{FF2B5EF4-FFF2-40B4-BE49-F238E27FC236}">
-                <a16:creationId xmlns:a16="http://schemas.microsoft.com/office/drawing/2014/main" xmlns="" id="{8232EFEC-41CA-4610-A4A0-C9FDB78CF1D4}"/>
+                <a16:creationId xmlns="" xmlns:a16="http://schemas.microsoft.com/office/drawing/2014/main" id="{8232EFEC-41CA-4610-A4A0-C9FDB78CF1D4}"/>
               </a:ext>
             </a:extLst>
           </p:cNvPr>
@@ -1616,7 +1616,7 @@
           <p:cNvPr id="7" name="Rectangle 6">
             <a:extLst>
               <a:ext uri="{FF2B5EF4-FFF2-40B4-BE49-F238E27FC236}">
-                <a16:creationId xmlns:a16="http://schemas.microsoft.com/office/drawing/2014/main" xmlns="" id="{8C2620B3-50E1-4F01-A173-0231A80F86CF}"/>
+                <a16:creationId xmlns="" xmlns:a16="http://schemas.microsoft.com/office/drawing/2014/main" id="{8C2620B3-50E1-4F01-A173-0231A80F86CF}"/>
               </a:ext>
             </a:extLst>
           </p:cNvPr>
@@ -1668,7 +1668,7 @@
           <p:cNvPr id="12" name="Titre 1">
             <a:extLst>
               <a:ext uri="{FF2B5EF4-FFF2-40B4-BE49-F238E27FC236}">
-                <a16:creationId xmlns:a16="http://schemas.microsoft.com/office/drawing/2014/main" xmlns="" id="{C211444D-A108-4D00-B6E3-16049A6308F9}"/>
+                <a16:creationId xmlns="" xmlns:a16="http://schemas.microsoft.com/office/drawing/2014/main" id="{C211444D-A108-4D00-B6E3-16049A6308F9}"/>
               </a:ext>
             </a:extLst>
           </p:cNvPr>
@@ -1718,7 +1718,7 @@
           <p:cNvPr id="14" name="Espace réservé du texte 13">
             <a:extLst>
               <a:ext uri="{FF2B5EF4-FFF2-40B4-BE49-F238E27FC236}">
-                <a16:creationId xmlns:a16="http://schemas.microsoft.com/office/drawing/2014/main" xmlns="" id="{679BB944-363A-4692-8AF4-7A1513D266E3}"/>
+                <a16:creationId xmlns="" xmlns:a16="http://schemas.microsoft.com/office/drawing/2014/main" id="{679BB944-363A-4692-8AF4-7A1513D266E3}"/>
               </a:ext>
             </a:extLst>
           </p:cNvPr>
@@ -1767,7 +1767,7 @@
           <p:cNvPr id="17" name="Espace réservé du texte 16">
             <a:extLst>
               <a:ext uri="{FF2B5EF4-FFF2-40B4-BE49-F238E27FC236}">
-                <a16:creationId xmlns:a16="http://schemas.microsoft.com/office/drawing/2014/main" xmlns="" id="{376627E5-ED42-4A5F-807D-99620B5CFF8F}"/>
+                <a16:creationId xmlns="" xmlns:a16="http://schemas.microsoft.com/office/drawing/2014/main" id="{376627E5-ED42-4A5F-807D-99620B5CFF8F}"/>
               </a:ext>
             </a:extLst>
           </p:cNvPr>
@@ -1816,7 +1816,7 @@
           <p:cNvPr id="11" name="Rectangle 10">
             <a:extLst>
               <a:ext uri="{FF2B5EF4-FFF2-40B4-BE49-F238E27FC236}">
-                <a16:creationId xmlns:a16="http://schemas.microsoft.com/office/drawing/2014/main" xmlns="" id="{E0E991CE-FF48-4A28-B040-25DA7C60A752}"/>
+                <a16:creationId xmlns="" xmlns:a16="http://schemas.microsoft.com/office/drawing/2014/main" id="{E0E991CE-FF48-4A28-B040-25DA7C60A752}"/>
               </a:ext>
             </a:extLst>
           </p:cNvPr>
@@ -1906,7 +1906,7 @@
           <p:cNvPr id="15" name="Espace réservé du texte 14">
             <a:extLst>
               <a:ext uri="{FF2B5EF4-FFF2-40B4-BE49-F238E27FC236}">
-                <a16:creationId xmlns:a16="http://schemas.microsoft.com/office/drawing/2014/main" xmlns="" id="{1872351A-E34B-4377-8D36-3DBD145FCE8F}"/>
+                <a16:creationId xmlns="" xmlns:a16="http://schemas.microsoft.com/office/drawing/2014/main" id="{1872351A-E34B-4377-8D36-3DBD145FCE8F}"/>
               </a:ext>
             </a:extLst>
           </p:cNvPr>
@@ -1957,7 +1957,7 @@
           <p:cNvPr id="12" name="Titre 1">
             <a:extLst>
               <a:ext uri="{FF2B5EF4-FFF2-40B4-BE49-F238E27FC236}">
-                <a16:creationId xmlns:a16="http://schemas.microsoft.com/office/drawing/2014/main" xmlns="" id="{8232EFEC-41CA-4610-A4A0-C9FDB78CF1D4}"/>
+                <a16:creationId xmlns="" xmlns:a16="http://schemas.microsoft.com/office/drawing/2014/main" id="{8232EFEC-41CA-4610-A4A0-C9FDB78CF1D4}"/>
               </a:ext>
             </a:extLst>
           </p:cNvPr>
@@ -2045,7 +2045,7 @@
           <p:cNvPr id="6" name="Rectangle 5">
             <a:extLst>
               <a:ext uri="{FF2B5EF4-FFF2-40B4-BE49-F238E27FC236}">
-                <a16:creationId xmlns:a16="http://schemas.microsoft.com/office/drawing/2014/main" xmlns="" id="{36B7274A-A76C-4D99-AE7E-992739F133A5}"/>
+                <a16:creationId xmlns="" xmlns:a16="http://schemas.microsoft.com/office/drawing/2014/main" id="{36B7274A-A76C-4D99-AE7E-992739F133A5}"/>
               </a:ext>
             </a:extLst>
           </p:cNvPr>
@@ -2101,7 +2101,7 @@
           <p:cNvPr id="2" name="Titre 1">
             <a:extLst>
               <a:ext uri="{FF2B5EF4-FFF2-40B4-BE49-F238E27FC236}">
-                <a16:creationId xmlns:a16="http://schemas.microsoft.com/office/drawing/2014/main" xmlns="" id="{B536A51D-38CE-428A-A9EB-9D68632F509F}"/>
+                <a16:creationId xmlns="" xmlns:a16="http://schemas.microsoft.com/office/drawing/2014/main" id="{B536A51D-38CE-428A-A9EB-9D68632F509F}"/>
               </a:ext>
             </a:extLst>
           </p:cNvPr>
@@ -2182,7 +2182,7 @@
           <p:cNvPr id="8" name="Rectangle 7">
             <a:extLst>
               <a:ext uri="{FF2B5EF4-FFF2-40B4-BE49-F238E27FC236}">
-                <a16:creationId xmlns:a16="http://schemas.microsoft.com/office/drawing/2014/main" xmlns="" id="{0DC3A185-DDF9-44CA-80B1-8F54E7001600}"/>
+                <a16:creationId xmlns="" xmlns:a16="http://schemas.microsoft.com/office/drawing/2014/main" id="{0DC3A185-DDF9-44CA-80B1-8F54E7001600}"/>
               </a:ext>
             </a:extLst>
           </p:cNvPr>
@@ -2234,7 +2234,7 @@
           <p:cNvPr id="2" name="Rectangle 1">
             <a:extLst>
               <a:ext uri="{FF2B5EF4-FFF2-40B4-BE49-F238E27FC236}">
-                <a16:creationId xmlns:a16="http://schemas.microsoft.com/office/drawing/2014/main" xmlns="" id="{B409C8A9-538B-4A7B-BE85-4B077E1ECFB9}"/>
+                <a16:creationId xmlns="" xmlns:a16="http://schemas.microsoft.com/office/drawing/2014/main" id="{B409C8A9-538B-4A7B-BE85-4B077E1ECFB9}"/>
               </a:ext>
             </a:extLst>
           </p:cNvPr>
@@ -2328,7 +2328,7 @@
           <p:cNvPr id="8" name="Rectangle 7">
             <a:extLst>
               <a:ext uri="{FF2B5EF4-FFF2-40B4-BE49-F238E27FC236}">
-                <a16:creationId xmlns:a16="http://schemas.microsoft.com/office/drawing/2014/main" xmlns="" id="{378C30C1-1750-4C93-8AD0-CC3831FA2949}"/>
+                <a16:creationId xmlns="" xmlns:a16="http://schemas.microsoft.com/office/drawing/2014/main" id="{378C30C1-1750-4C93-8AD0-CC3831FA2949}"/>
               </a:ext>
             </a:extLst>
           </p:cNvPr>
@@ -2384,7 +2384,7 @@
           <p:cNvPr id="5" name="Rectangle 4">
             <a:extLst>
               <a:ext uri="{FF2B5EF4-FFF2-40B4-BE49-F238E27FC236}">
-                <a16:creationId xmlns:a16="http://schemas.microsoft.com/office/drawing/2014/main" xmlns="" id="{A57C4C57-6A89-4CBA-B531-4BA9A7BB3B97}"/>
+                <a16:creationId xmlns="" xmlns:a16="http://schemas.microsoft.com/office/drawing/2014/main" id="{A57C4C57-6A89-4CBA-B531-4BA9A7BB3B97}"/>
               </a:ext>
             </a:extLst>
           </p:cNvPr>
@@ -2774,7 +2774,7 @@
           <p:cNvPr id="5" name="Titre 4">
             <a:extLst>
               <a:ext uri="{FF2B5EF4-FFF2-40B4-BE49-F238E27FC236}">
-                <a16:creationId xmlns:a16="http://schemas.microsoft.com/office/drawing/2014/main" xmlns="" id="{1AA53381-BB4B-4436-A81C-A7BDD14ADA87}"/>
+                <a16:creationId xmlns="" xmlns:a16="http://schemas.microsoft.com/office/drawing/2014/main" id="{1AA53381-BB4B-4436-A81C-A7BDD14ADA87}"/>
               </a:ext>
             </a:extLst>
           </p:cNvPr>
@@ -2817,7 +2817,7 @@
           <p:cNvPr id="6" name="Espace réservé du texte 5">
             <a:extLst>
               <a:ext uri="{FF2B5EF4-FFF2-40B4-BE49-F238E27FC236}">
-                <a16:creationId xmlns:a16="http://schemas.microsoft.com/office/drawing/2014/main" xmlns="" id="{502F3C57-CAA9-4715-B946-5435326569E2}"/>
+                <a16:creationId xmlns="" xmlns:a16="http://schemas.microsoft.com/office/drawing/2014/main" id="{502F3C57-CAA9-4715-B946-5435326569E2}"/>
               </a:ext>
             </a:extLst>
           </p:cNvPr>
@@ -2845,7 +2845,7 @@
           <p:cNvPr id="7" name="Espace réservé du texte 6">
             <a:extLst>
               <a:ext uri="{FF2B5EF4-FFF2-40B4-BE49-F238E27FC236}">
-                <a16:creationId xmlns:a16="http://schemas.microsoft.com/office/drawing/2014/main" xmlns="" id="{4BFDF0F5-DFD5-4E2B-ADCB-D185AD6421C0}"/>
+                <a16:creationId xmlns="" xmlns:a16="http://schemas.microsoft.com/office/drawing/2014/main" id="{4BFDF0F5-DFD5-4E2B-ADCB-D185AD6421C0}"/>
               </a:ext>
             </a:extLst>
           </p:cNvPr>
@@ -2907,7 +2907,7 @@
           <p:cNvPr id="2" name="Espace réservé du texte 1">
             <a:extLst>
               <a:ext uri="{FF2B5EF4-FFF2-40B4-BE49-F238E27FC236}">
-                <a16:creationId xmlns:a16="http://schemas.microsoft.com/office/drawing/2014/main" xmlns="" id="{86577DD4-8D9B-4068-8F66-6CBF222C3206}"/>
+                <a16:creationId xmlns="" xmlns:a16="http://schemas.microsoft.com/office/drawing/2014/main" id="{86577DD4-8D9B-4068-8F66-6CBF222C3206}"/>
               </a:ext>
             </a:extLst>
           </p:cNvPr>
@@ -3061,17 +3061,7 @@
                 <a:latin typeface="Calibri" panose="020F0502020204030204" pitchFamily="34" charset="0"/>
                 <a:ea typeface="Fira Sans" panose="020B0503050000020004" pitchFamily="34" charset="0"/>
               </a:rPr>
-              <a:t> </a:t>
-            </a:r>
-            <a:r>
-              <a:rPr lang="fr-FR" dirty="0" smtClean="0">
-                <a:solidFill>
-                  <a:schemeClr val="accent2"/>
-                </a:solidFill>
-                <a:latin typeface="Calibri" panose="020F0502020204030204" pitchFamily="34" charset="0"/>
-                <a:ea typeface="Fira Sans" panose="020B0503050000020004" pitchFamily="34" charset="0"/>
-              </a:rPr>
-              <a:t>major </a:t>
+              <a:t> major </a:t>
             </a:r>
             <a:r>
               <a:rPr lang="fr-FR" dirty="0" err="1" smtClean="0">
@@ -3175,17 +3165,7 @@
                 <a:latin typeface="Calibri" panose="020F0502020204030204" pitchFamily="34" charset="0"/>
                 <a:ea typeface="Fira Sans" panose="020B0503050000020004" pitchFamily="34" charset="0"/>
               </a:rPr>
-              <a:t> </a:t>
-            </a:r>
-            <a:r>
-              <a:rPr lang="fr-FR" dirty="0" smtClean="0">
-                <a:solidFill>
-                  <a:schemeClr val="tx2"/>
-                </a:solidFill>
-                <a:latin typeface="Calibri" panose="020F0502020204030204" pitchFamily="34" charset="0"/>
-                <a:ea typeface="Fira Sans" panose="020B0503050000020004" pitchFamily="34" charset="0"/>
-              </a:rPr>
-              <a:t>minor </a:t>
+              <a:t> minor </a:t>
             </a:r>
             <a:r>
               <a:rPr lang="fr-FR" dirty="0" err="1" smtClean="0">
@@ -3232,17 +3212,7 @@
                 <a:latin typeface="Calibri" panose="020F0502020204030204" pitchFamily="34" charset="0"/>
                 <a:ea typeface="Fira Sans" panose="020B0503050000020004" pitchFamily="34" charset="0"/>
               </a:rPr>
-              <a:t> </a:t>
-            </a:r>
-            <a:r>
-              <a:rPr lang="fr-FR" dirty="0" smtClean="0">
-                <a:solidFill>
-                  <a:srgbClr val="0070C0"/>
-                </a:solidFill>
-                <a:latin typeface="Calibri" panose="020F0502020204030204" pitchFamily="34" charset="0"/>
-                <a:ea typeface="Fira Sans" panose="020B0503050000020004" pitchFamily="34" charset="0"/>
-              </a:rPr>
-              <a:t>fixes to </a:t>
+              <a:t> fixes to </a:t>
             </a:r>
             <a:r>
               <a:rPr lang="fr-FR" dirty="0" err="1" smtClean="0">
@@ -3317,7 +3287,7 @@
           <p:cNvPr id="3" name="Titre 2">
             <a:extLst>
               <a:ext uri="{FF2B5EF4-FFF2-40B4-BE49-F238E27FC236}">
-                <a16:creationId xmlns:a16="http://schemas.microsoft.com/office/drawing/2014/main" xmlns="" id="{D9E91A38-792C-4512-8630-77329A84C825}"/>
+                <a16:creationId xmlns="" xmlns:a16="http://schemas.microsoft.com/office/drawing/2014/main" id="{D9E91A38-792C-4512-8630-77329A84C825}"/>
               </a:ext>
             </a:extLst>
           </p:cNvPr>
@@ -3348,7 +3318,7 @@
           <p:cNvPr id="4" name="Graphique 3">
             <a:extLst>
               <a:ext uri="{FF2B5EF4-FFF2-40B4-BE49-F238E27FC236}">
-                <a16:creationId xmlns:a16="http://schemas.microsoft.com/office/drawing/2014/main" xmlns="" id="{49F51790-C541-4224-94CB-44177286E025}"/>
+                <a16:creationId xmlns="" xmlns:a16="http://schemas.microsoft.com/office/drawing/2014/main" id="{49F51790-C541-4224-94CB-44177286E025}"/>
               </a:ext>
             </a:extLst>
           </p:cNvPr>
@@ -3356,7 +3326,7 @@
           <p:nvPr>
             <p:extLst>
               <p:ext uri="{D42A27DB-BD31-4B8C-83A1-F6EECF244321}">
-                <p14:modId xmlns:p14="http://schemas.microsoft.com/office/powerpoint/2010/main" val="3534380921"/>
+                <p14:modId xmlns:p14="http://schemas.microsoft.com/office/powerpoint/2010/main" val="387632836"/>
               </p:ext>
             </p:extLst>
           </p:nvPr>
@@ -3413,7 +3383,7 @@
           <p:cNvPr id="3" name="Titre 2">
             <a:extLst>
               <a:ext uri="{FF2B5EF4-FFF2-40B4-BE49-F238E27FC236}">
-                <a16:creationId xmlns:a16="http://schemas.microsoft.com/office/drawing/2014/main" xmlns="" id="{3F03447C-16C5-4CBC-BC7C-C6B75433E15D}"/>
+                <a16:creationId xmlns="" xmlns:a16="http://schemas.microsoft.com/office/drawing/2014/main" id="{3F03447C-16C5-4CBC-BC7C-C6B75433E15D}"/>
               </a:ext>
             </a:extLst>
           </p:cNvPr>
@@ -3456,7 +3426,7 @@
           <p:cNvPr id="4" name="Tableau 3">
             <a:extLst>
               <a:ext uri="{FF2B5EF4-FFF2-40B4-BE49-F238E27FC236}">
-                <a16:creationId xmlns:a16="http://schemas.microsoft.com/office/drawing/2014/main" xmlns="" id="{55115E22-C5EE-4776-81BA-626B91DB99DB}"/>
+                <a16:creationId xmlns="" xmlns:a16="http://schemas.microsoft.com/office/drawing/2014/main" id="{55115E22-C5EE-4776-81BA-626B91DB99DB}"/>
               </a:ext>
             </a:extLst>
           </p:cNvPr>
@@ -3466,7 +3436,7 @@
           <p:nvPr>
             <p:extLst>
               <p:ext uri="{D42A27DB-BD31-4B8C-83A1-F6EECF244321}">
-                <p14:modId xmlns:p14="http://schemas.microsoft.com/office/powerpoint/2010/main" val="2045736426"/>
+                <p14:modId xmlns:p14="http://schemas.microsoft.com/office/powerpoint/2010/main" val="1783207361"/>
               </p:ext>
             </p:extLst>
           </p:nvPr>
@@ -3483,28 +3453,28 @@
                 <a:gridCol w="564452">
                   <a:extLst>
                     <a:ext uri="{9D8B030D-6E8A-4147-A177-3AD203B41FA5}">
-                      <a16:colId xmlns:a16="http://schemas.microsoft.com/office/drawing/2014/main" xmlns="" val="1282180568"/>
+                      <a16:colId xmlns="" xmlns:a16="http://schemas.microsoft.com/office/drawing/2014/main" val="1282180568"/>
                     </a:ext>
                   </a:extLst>
                 </a:gridCol>
                 <a:gridCol w="6478438">
                   <a:extLst>
                     <a:ext uri="{9D8B030D-6E8A-4147-A177-3AD203B41FA5}">
-                      <a16:colId xmlns:a16="http://schemas.microsoft.com/office/drawing/2014/main" xmlns="" val="151414170"/>
+                      <a16:colId xmlns="" xmlns:a16="http://schemas.microsoft.com/office/drawing/2014/main" val="151414170"/>
                     </a:ext>
                   </a:extLst>
                 </a:gridCol>
                 <a:gridCol w="1233577">
                   <a:extLst>
                     <a:ext uri="{9D8B030D-6E8A-4147-A177-3AD203B41FA5}">
-                      <a16:colId xmlns:a16="http://schemas.microsoft.com/office/drawing/2014/main" xmlns="" val="2960671948"/>
+                      <a16:colId xmlns="" xmlns:a16="http://schemas.microsoft.com/office/drawing/2014/main" val="2960671948"/>
                     </a:ext>
                   </a:extLst>
                 </a:gridCol>
                 <a:gridCol w="966159">
                   <a:extLst>
                     <a:ext uri="{9D8B030D-6E8A-4147-A177-3AD203B41FA5}">
-                      <a16:colId xmlns:a16="http://schemas.microsoft.com/office/drawing/2014/main" xmlns="" val="2450359460"/>
+                      <a16:colId xmlns="" xmlns:a16="http://schemas.microsoft.com/office/drawing/2014/main" val="2450359460"/>
                     </a:ext>
                   </a:extLst>
                 </a:gridCol>
@@ -3689,7 +3659,7 @@
                         </a:spcAft>
                       </a:pPr>
                       <a:r>
-                        <a:rPr lang="fr-FR" sz="1200" i="1" dirty="0">
+                        <a:rPr lang="fr-FR" sz="1200" i="1" dirty="0" err="1" smtClean="0">
                           <a:solidFill>
                             <a:srgbClr val="FFFFFF"/>
                           </a:solidFill>
@@ -3698,7 +3668,7 @@
                           <a:ea typeface="Times New Roman" panose="02020603050405020304" pitchFamily="18" charset="0"/>
                           <a:cs typeface="Times New Roman" panose="02020603050405020304" pitchFamily="18" charset="0"/>
                         </a:rPr>
-                        <a:t>Exploitation</a:t>
+                        <a:t>var_h_exploitation</a:t>
                       </a:r>
                       <a:endParaRPr lang="fr-FR" sz="1500" dirty="0">
                         <a:solidFill>
@@ -3770,7 +3740,7 @@
                         </a:spcAft>
                       </a:pPr>
                       <a:r>
-                        <a:rPr lang="fr-FR" sz="1200" i="1">
+                        <a:rPr lang="fr-FR" sz="1200" i="1" dirty="0" err="1" smtClean="0">
                           <a:solidFill>
                             <a:srgbClr val="FFFFFF"/>
                           </a:solidFill>
@@ -3779,9 +3749,9 @@
                           <a:ea typeface="Times New Roman" panose="02020603050405020304" pitchFamily="18" charset="0"/>
                           <a:cs typeface="Times New Roman" panose="02020603050405020304" pitchFamily="18" charset="0"/>
                         </a:rPr>
-                        <a:t>Impact</a:t>
+                        <a:t>var_h_impact</a:t>
                       </a:r>
-                      <a:endParaRPr lang="fr-FR" sz="1500">
+                      <a:endParaRPr lang="fr-FR" sz="1500" dirty="0">
                         <a:solidFill>
                           <a:srgbClr val="263232"/>
                         </a:solidFill>
@@ -3836,7 +3806,7 @@
                 </a:tc>
                 <a:extLst>
                   <a:ext uri="{0D108BD9-81ED-4DB2-BD59-A6C34878D82A}">
-                    <a16:rowId xmlns:a16="http://schemas.microsoft.com/office/drawing/2014/main" xmlns="" val="2551652828"/>
+                    <a16:rowId xmlns="" xmlns:a16="http://schemas.microsoft.com/office/drawing/2014/main" val="2551652828"/>
                   </a:ext>
                 </a:extLst>
               </a:tr>
@@ -4025,7 +3995,7 @@
                 </a:tc>
                 <a:extLst>
                   <a:ext uri="{0D108BD9-81ED-4DB2-BD59-A6C34878D82A}">
-                    <a16:rowId xmlns:a16="http://schemas.microsoft.com/office/drawing/2014/main" xmlns="" val="2110200768"/>
+                    <a16:rowId xmlns="" xmlns:a16="http://schemas.microsoft.com/office/drawing/2014/main" val="2110200768"/>
                   </a:ext>
                 </a:extLst>
               </a:tr>
@@ -4140,7 +4110,7 @@
                 </a:tc>
                 <a:extLst>
                   <a:ext uri="{0D108BD9-81ED-4DB2-BD59-A6C34878D82A}">
-                    <a16:rowId xmlns:a16="http://schemas.microsoft.com/office/drawing/2014/main" xmlns="" val="1088236970"/>
+                    <a16:rowId xmlns="" xmlns:a16="http://schemas.microsoft.com/office/drawing/2014/main" val="1088236970"/>
                   </a:ext>
                 </a:extLst>
               </a:tr>
@@ -4153,7 +4123,7 @@
           <p:cNvPr id="5" name="ZoneTexte 4">
             <a:extLst>
               <a:ext uri="{FF2B5EF4-FFF2-40B4-BE49-F238E27FC236}">
-                <a16:creationId xmlns:a16="http://schemas.microsoft.com/office/drawing/2014/main" xmlns="" id="{C29B5C58-411F-4713-B096-7C8A610D2436}"/>
+                <a16:creationId xmlns="" xmlns:a16="http://schemas.microsoft.com/office/drawing/2014/main" id="{C29B5C58-411F-4713-B096-7C8A610D2436}"/>
               </a:ext>
             </a:extLst>
           </p:cNvPr>
@@ -4163,7 +4133,7 @@
         <p:spPr>
           <a:xfrm>
             <a:off x="453465" y="5926347"/>
-            <a:ext cx="4035272" cy="369332"/>
+            <a:ext cx="2681760" cy="369332"/>
           </a:xfrm>
           <a:prstGeom prst="rect">
             <a:avLst/>
@@ -4177,7 +4147,7 @@
           <a:lstStyle/>
           <a:p>
             <a:r>
-              <a:rPr lang="fr-FR" b="1" dirty="0">
+              <a:rPr lang="fr-FR" b="1" dirty="0" smtClean="0">
                 <a:solidFill>
                   <a:schemeClr val="accent5"/>
                 </a:solidFill>
@@ -4186,12 +4156,22 @@
               <a:t></a:t>
             </a:r>
             <a:r>
-              <a:rPr lang="fr-FR" b="1" dirty="0">
+              <a:rPr lang="fr-FR" b="1" dirty="0" err="1" smtClean="0">
                 <a:solidFill>
                   <a:schemeClr val="accent5"/>
                 </a:solidFill>
+                <a:sym typeface="Wingdings 3" panose="05040102010807070707" pitchFamily="18" charset="2"/>
               </a:rPr>
-              <a:t>Action corrective </a:t>
+              <a:t>Fix</a:t>
+            </a:r>
+            <a:r>
+              <a:rPr lang="fr-FR" b="1" dirty="0" smtClean="0">
+                <a:solidFill>
+                  <a:schemeClr val="accent5"/>
+                </a:solidFill>
+                <a:sym typeface="Wingdings 3" panose="05040102010807070707" pitchFamily="18" charset="2"/>
+              </a:rPr>
+              <a:t> </a:t>
             </a:r>
             <a:r>
               <a:rPr lang="fr-FR" b="1" dirty="0" err="1" smtClean="0">
@@ -4275,7 +4255,7 @@
           <p:cNvPr id="3" name="Titre 2">
             <a:extLst>
               <a:ext uri="{FF2B5EF4-FFF2-40B4-BE49-F238E27FC236}">
-                <a16:creationId xmlns:a16="http://schemas.microsoft.com/office/drawing/2014/main" xmlns="" id="{3F03447C-16C5-4CBC-BC7C-C6B75433E15D}"/>
+                <a16:creationId xmlns="" xmlns:a16="http://schemas.microsoft.com/office/drawing/2014/main" id="{3F03447C-16C5-4CBC-BC7C-C6B75433E15D}"/>
               </a:ext>
             </a:extLst>
           </p:cNvPr>
@@ -4318,7 +4298,7 @@
           <p:cNvPr id="4" name="Tableau 3">
             <a:extLst>
               <a:ext uri="{FF2B5EF4-FFF2-40B4-BE49-F238E27FC236}">
-                <a16:creationId xmlns:a16="http://schemas.microsoft.com/office/drawing/2014/main" xmlns="" id="{55115E22-C5EE-4776-81BA-626B91DB99DB}"/>
+                <a16:creationId xmlns="" xmlns:a16="http://schemas.microsoft.com/office/drawing/2014/main" id="{55115E22-C5EE-4776-81BA-626B91DB99DB}"/>
               </a:ext>
             </a:extLst>
           </p:cNvPr>
@@ -4328,7 +4308,7 @@
           <p:nvPr>
             <p:extLst>
               <p:ext uri="{D42A27DB-BD31-4B8C-83A1-F6EECF244321}">
-                <p14:modId xmlns:p14="http://schemas.microsoft.com/office/powerpoint/2010/main" val="3184195503"/>
+                <p14:modId xmlns:p14="http://schemas.microsoft.com/office/powerpoint/2010/main" val="4240665505"/>
               </p:ext>
             </p:extLst>
           </p:nvPr>
@@ -4345,28 +4325,28 @@
                 <a:gridCol w="564452">
                   <a:extLst>
                     <a:ext uri="{9D8B030D-6E8A-4147-A177-3AD203B41FA5}">
-                      <a16:colId xmlns:a16="http://schemas.microsoft.com/office/drawing/2014/main" xmlns="" val="1282180568"/>
+                      <a16:colId xmlns="" xmlns:a16="http://schemas.microsoft.com/office/drawing/2014/main" val="1282180568"/>
                     </a:ext>
                   </a:extLst>
                 </a:gridCol>
                 <a:gridCol w="6478438">
                   <a:extLst>
                     <a:ext uri="{9D8B030D-6E8A-4147-A177-3AD203B41FA5}">
-                      <a16:colId xmlns:a16="http://schemas.microsoft.com/office/drawing/2014/main" xmlns="" val="151414170"/>
+                      <a16:colId xmlns="" xmlns:a16="http://schemas.microsoft.com/office/drawing/2014/main" val="151414170"/>
                     </a:ext>
                   </a:extLst>
                 </a:gridCol>
                 <a:gridCol w="1233577">
                   <a:extLst>
                     <a:ext uri="{9D8B030D-6E8A-4147-A177-3AD203B41FA5}">
-                      <a16:colId xmlns:a16="http://schemas.microsoft.com/office/drawing/2014/main" xmlns="" val="2960671948"/>
+                      <a16:colId xmlns="" xmlns:a16="http://schemas.microsoft.com/office/drawing/2014/main" val="2960671948"/>
                     </a:ext>
                   </a:extLst>
                 </a:gridCol>
                 <a:gridCol w="966159">
                   <a:extLst>
                     <a:ext uri="{9D8B030D-6E8A-4147-A177-3AD203B41FA5}">
-                      <a16:colId xmlns:a16="http://schemas.microsoft.com/office/drawing/2014/main" xmlns="" val="2450359460"/>
+                      <a16:colId xmlns="" xmlns:a16="http://schemas.microsoft.com/office/drawing/2014/main" val="2450359460"/>
                     </a:ext>
                   </a:extLst>
                 </a:gridCol>
@@ -4551,7 +4531,7 @@
                         </a:spcAft>
                       </a:pPr>
                       <a:r>
-                        <a:rPr lang="fr-FR" sz="1200" i="1" dirty="0">
+                        <a:rPr lang="fr-FR" sz="1200" i="1" dirty="0" err="1" smtClean="0">
                           <a:solidFill>
                             <a:srgbClr val="FFFFFF"/>
                           </a:solidFill>
@@ -4560,7 +4540,7 @@
                           <a:ea typeface="Times New Roman" panose="02020603050405020304" pitchFamily="18" charset="0"/>
                           <a:cs typeface="Times New Roman" panose="02020603050405020304" pitchFamily="18" charset="0"/>
                         </a:rPr>
-                        <a:t>Exploitation</a:t>
+                        <a:t>var_h_exploitation</a:t>
                       </a:r>
                       <a:endParaRPr lang="fr-FR" sz="1500" dirty="0">
                         <a:solidFill>
@@ -4632,7 +4612,7 @@
                         </a:spcAft>
                       </a:pPr>
                       <a:r>
-                        <a:rPr lang="fr-FR" sz="1200" i="1" dirty="0">
+                        <a:rPr lang="fr-FR" sz="1200" i="1" dirty="0" err="1" smtClean="0">
                           <a:solidFill>
                             <a:srgbClr val="FFFFFF"/>
                           </a:solidFill>
@@ -4641,7 +4621,7 @@
                           <a:ea typeface="Times New Roman" panose="02020603050405020304" pitchFamily="18" charset="0"/>
                           <a:cs typeface="Times New Roman" panose="02020603050405020304" pitchFamily="18" charset="0"/>
                         </a:rPr>
-                        <a:t>Impact</a:t>
+                        <a:t>var_h_impact</a:t>
                       </a:r>
                       <a:endParaRPr lang="fr-FR" sz="1500" dirty="0">
                         <a:solidFill>
@@ -4698,7 +4678,7 @@
                 </a:tc>
                 <a:extLst>
                   <a:ext uri="{0D108BD9-81ED-4DB2-BD59-A6C34878D82A}">
-                    <a16:rowId xmlns:a16="http://schemas.microsoft.com/office/drawing/2014/main" xmlns="" val="2551652828"/>
+                    <a16:rowId xmlns="" xmlns:a16="http://schemas.microsoft.com/office/drawing/2014/main" val="2551652828"/>
                   </a:ext>
                 </a:extLst>
               </a:tr>
@@ -4887,7 +4867,7 @@
                 </a:tc>
                 <a:extLst>
                   <a:ext uri="{0D108BD9-81ED-4DB2-BD59-A6C34878D82A}">
-                    <a16:rowId xmlns:a16="http://schemas.microsoft.com/office/drawing/2014/main" xmlns="" val="2110200768"/>
+                    <a16:rowId xmlns="" xmlns:a16="http://schemas.microsoft.com/office/drawing/2014/main" val="2110200768"/>
                   </a:ext>
                 </a:extLst>
               </a:tr>
@@ -5008,7 +4988,7 @@
                 </a:tc>
                 <a:extLst>
                   <a:ext uri="{0D108BD9-81ED-4DB2-BD59-A6C34878D82A}">
-                    <a16:rowId xmlns:a16="http://schemas.microsoft.com/office/drawing/2014/main" xmlns="" val="1088236970"/>
+                    <a16:rowId xmlns="" xmlns:a16="http://schemas.microsoft.com/office/drawing/2014/main" val="1088236970"/>
                   </a:ext>
                 </a:extLst>
               </a:tr>
@@ -5021,7 +5001,7 @@
           <p:cNvPr id="6" name="ZoneTexte 5">
             <a:extLst>
               <a:ext uri="{FF2B5EF4-FFF2-40B4-BE49-F238E27FC236}">
-                <a16:creationId xmlns:a16="http://schemas.microsoft.com/office/drawing/2014/main" xmlns="" id="{C29B5C58-411F-4713-B096-7C8A610D2436}"/>
+                <a16:creationId xmlns="" xmlns:a16="http://schemas.microsoft.com/office/drawing/2014/main" id="{C29B5C58-411F-4713-B096-7C8A610D2436}"/>
               </a:ext>
             </a:extLst>
           </p:cNvPr>
@@ -5031,7 +5011,7 @@
         <p:spPr>
           <a:xfrm>
             <a:off x="453465" y="5926347"/>
-            <a:ext cx="4035272" cy="369332"/>
+            <a:ext cx="2681760" cy="369332"/>
           </a:xfrm>
           <a:prstGeom prst="rect">
             <a:avLst/>
@@ -5045,7 +5025,7 @@
           <a:lstStyle/>
           <a:p>
             <a:r>
-              <a:rPr lang="fr-FR" b="1" dirty="0">
+              <a:rPr lang="fr-FR" b="1" dirty="0" smtClean="0">
                 <a:solidFill>
                   <a:schemeClr val="accent5"/>
                 </a:solidFill>
@@ -5054,12 +5034,20 @@
               <a:t></a:t>
             </a:r>
             <a:r>
-              <a:rPr lang="fr-FR" b="1" dirty="0">
+              <a:rPr lang="fr-FR" b="1" dirty="0" err="1" smtClean="0">
                 <a:solidFill>
                   <a:schemeClr val="accent5"/>
                 </a:solidFill>
               </a:rPr>
-              <a:t>Action corrective </a:t>
+              <a:t>Fix</a:t>
+            </a:r>
+            <a:r>
+              <a:rPr lang="fr-FR" b="1" dirty="0" smtClean="0">
+                <a:solidFill>
+                  <a:schemeClr val="accent5"/>
+                </a:solidFill>
+              </a:rPr>
+              <a:t> </a:t>
             </a:r>
             <a:r>
               <a:rPr lang="fr-FR" b="1" dirty="0" err="1" smtClean="0">
@@ -5143,7 +5131,7 @@
           <p:cNvPr id="3" name="Titre 2">
             <a:extLst>
               <a:ext uri="{FF2B5EF4-FFF2-40B4-BE49-F238E27FC236}">
-                <a16:creationId xmlns:a16="http://schemas.microsoft.com/office/drawing/2014/main" xmlns="" id="{3F03447C-16C5-4CBC-BC7C-C6B75433E15D}"/>
+                <a16:creationId xmlns="" xmlns:a16="http://schemas.microsoft.com/office/drawing/2014/main" id="{3F03447C-16C5-4CBC-BC7C-C6B75433E15D}"/>
               </a:ext>
             </a:extLst>
           </p:cNvPr>
@@ -5186,7 +5174,7 @@
           <p:cNvPr id="4" name="Tableau 3">
             <a:extLst>
               <a:ext uri="{FF2B5EF4-FFF2-40B4-BE49-F238E27FC236}">
-                <a16:creationId xmlns:a16="http://schemas.microsoft.com/office/drawing/2014/main" xmlns="" id="{55115E22-C5EE-4776-81BA-626B91DB99DB}"/>
+                <a16:creationId xmlns="" xmlns:a16="http://schemas.microsoft.com/office/drawing/2014/main" id="{55115E22-C5EE-4776-81BA-626B91DB99DB}"/>
               </a:ext>
             </a:extLst>
           </p:cNvPr>
@@ -5196,7 +5184,7 @@
           <p:nvPr>
             <p:extLst>
               <p:ext uri="{D42A27DB-BD31-4B8C-83A1-F6EECF244321}">
-                <p14:modId xmlns:p14="http://schemas.microsoft.com/office/powerpoint/2010/main" val="2693915924"/>
+                <p14:modId xmlns:p14="http://schemas.microsoft.com/office/powerpoint/2010/main" val="4186755157"/>
               </p:ext>
             </p:extLst>
           </p:nvPr>
@@ -5213,28 +5201,28 @@
                 <a:gridCol w="564452">
                   <a:extLst>
                     <a:ext uri="{9D8B030D-6E8A-4147-A177-3AD203B41FA5}">
-                      <a16:colId xmlns:a16="http://schemas.microsoft.com/office/drawing/2014/main" xmlns="" val="1282180568"/>
+                      <a16:colId xmlns="" xmlns:a16="http://schemas.microsoft.com/office/drawing/2014/main" val="1282180568"/>
                     </a:ext>
                   </a:extLst>
                 </a:gridCol>
                 <a:gridCol w="6478438">
                   <a:extLst>
                     <a:ext uri="{9D8B030D-6E8A-4147-A177-3AD203B41FA5}">
-                      <a16:colId xmlns:a16="http://schemas.microsoft.com/office/drawing/2014/main" xmlns="" val="151414170"/>
+                      <a16:colId xmlns="" xmlns:a16="http://schemas.microsoft.com/office/drawing/2014/main" val="151414170"/>
                     </a:ext>
                   </a:extLst>
                 </a:gridCol>
                 <a:gridCol w="1233577">
                   <a:extLst>
                     <a:ext uri="{9D8B030D-6E8A-4147-A177-3AD203B41FA5}">
-                      <a16:colId xmlns:a16="http://schemas.microsoft.com/office/drawing/2014/main" xmlns="" val="2960671948"/>
+                      <a16:colId xmlns="" xmlns:a16="http://schemas.microsoft.com/office/drawing/2014/main" val="2960671948"/>
                     </a:ext>
                   </a:extLst>
                 </a:gridCol>
                 <a:gridCol w="966159">
                   <a:extLst>
                     <a:ext uri="{9D8B030D-6E8A-4147-A177-3AD203B41FA5}">
-                      <a16:colId xmlns:a16="http://schemas.microsoft.com/office/drawing/2014/main" xmlns="" val="2450359460"/>
+                      <a16:colId xmlns="" xmlns:a16="http://schemas.microsoft.com/office/drawing/2014/main" val="2450359460"/>
                     </a:ext>
                   </a:extLst>
                 </a:gridCol>
@@ -5419,7 +5407,7 @@
                         </a:spcAft>
                       </a:pPr>
                       <a:r>
-                        <a:rPr lang="fr-FR" sz="1200" i="1" dirty="0">
+                        <a:rPr lang="fr-FR" sz="1200" i="1" dirty="0" err="1" smtClean="0">
                           <a:solidFill>
                             <a:srgbClr val="FFFFFF"/>
                           </a:solidFill>
@@ -5428,7 +5416,7 @@
                           <a:ea typeface="Times New Roman" panose="02020603050405020304" pitchFamily="18" charset="0"/>
                           <a:cs typeface="Times New Roman" panose="02020603050405020304" pitchFamily="18" charset="0"/>
                         </a:rPr>
-                        <a:t>Exploitation</a:t>
+                        <a:t>var_h_exploitation</a:t>
                       </a:r>
                       <a:endParaRPr lang="fr-FR" sz="1500" dirty="0">
                         <a:solidFill>
@@ -5500,7 +5488,7 @@
                         </a:spcAft>
                       </a:pPr>
                       <a:r>
-                        <a:rPr lang="fr-FR" sz="1200" i="1">
+                        <a:rPr lang="fr-FR" sz="1200" i="1" dirty="0" err="1" smtClean="0">
                           <a:solidFill>
                             <a:srgbClr val="FFFFFF"/>
                           </a:solidFill>
@@ -5509,9 +5497,9 @@
                           <a:ea typeface="Times New Roman" panose="02020603050405020304" pitchFamily="18" charset="0"/>
                           <a:cs typeface="Times New Roman" panose="02020603050405020304" pitchFamily="18" charset="0"/>
                         </a:rPr>
-                        <a:t>Impact</a:t>
+                        <a:t>var_h_impact</a:t>
                       </a:r>
-                      <a:endParaRPr lang="fr-FR" sz="1500">
+                      <a:endParaRPr lang="fr-FR" sz="1500" dirty="0">
                         <a:solidFill>
                           <a:srgbClr val="263232"/>
                         </a:solidFill>
@@ -5566,7 +5554,7 @@
                 </a:tc>
                 <a:extLst>
                   <a:ext uri="{0D108BD9-81ED-4DB2-BD59-A6C34878D82A}">
-                    <a16:rowId xmlns:a16="http://schemas.microsoft.com/office/drawing/2014/main" xmlns="" val="2551652828"/>
+                    <a16:rowId xmlns="" xmlns:a16="http://schemas.microsoft.com/office/drawing/2014/main" val="2551652828"/>
                   </a:ext>
                 </a:extLst>
               </a:tr>
@@ -5755,7 +5743,7 @@
                 </a:tc>
                 <a:extLst>
                   <a:ext uri="{0D108BD9-81ED-4DB2-BD59-A6C34878D82A}">
-                    <a16:rowId xmlns:a16="http://schemas.microsoft.com/office/drawing/2014/main" xmlns="" val="2110200768"/>
+                    <a16:rowId xmlns="" xmlns:a16="http://schemas.microsoft.com/office/drawing/2014/main" val="2110200768"/>
                   </a:ext>
                 </a:extLst>
               </a:tr>
@@ -5876,7 +5864,7 @@
                 </a:tc>
                 <a:extLst>
                   <a:ext uri="{0D108BD9-81ED-4DB2-BD59-A6C34878D82A}">
-                    <a16:rowId xmlns:a16="http://schemas.microsoft.com/office/drawing/2014/main" xmlns="" val="1088236970"/>
+                    <a16:rowId xmlns="" xmlns:a16="http://schemas.microsoft.com/office/drawing/2014/main" val="1088236970"/>
                   </a:ext>
                 </a:extLst>
               </a:tr>
@@ -5889,7 +5877,7 @@
           <p:cNvPr id="6" name="ZoneTexte 5">
             <a:extLst>
               <a:ext uri="{FF2B5EF4-FFF2-40B4-BE49-F238E27FC236}">
-                <a16:creationId xmlns:a16="http://schemas.microsoft.com/office/drawing/2014/main" xmlns="" id="{C29B5C58-411F-4713-B096-7C8A610D2436}"/>
+                <a16:creationId xmlns="" xmlns:a16="http://schemas.microsoft.com/office/drawing/2014/main" id="{C29B5C58-411F-4713-B096-7C8A610D2436}"/>
               </a:ext>
             </a:extLst>
           </p:cNvPr>
@@ -5899,7 +5887,7 @@
         <p:spPr>
           <a:xfrm>
             <a:off x="453465" y="5926347"/>
-            <a:ext cx="4035272" cy="369332"/>
+            <a:ext cx="2681760" cy="369332"/>
           </a:xfrm>
           <a:prstGeom prst="rect">
             <a:avLst/>
@@ -5913,7 +5901,7 @@
           <a:lstStyle/>
           <a:p>
             <a:r>
-              <a:rPr lang="fr-FR" b="1" dirty="0">
+              <a:rPr lang="fr-FR" b="1" dirty="0" smtClean="0">
                 <a:solidFill>
                   <a:schemeClr val="accent5"/>
                 </a:solidFill>
@@ -5922,12 +5910,20 @@
               <a:t></a:t>
             </a:r>
             <a:r>
-              <a:rPr lang="fr-FR" b="1" dirty="0">
+              <a:rPr lang="fr-FR" b="1" dirty="0" err="1" smtClean="0">
                 <a:solidFill>
                   <a:schemeClr val="accent5"/>
                 </a:solidFill>
               </a:rPr>
-              <a:t>Action corrective </a:t>
+              <a:t>Fix</a:t>
+            </a:r>
+            <a:r>
+              <a:rPr lang="fr-FR" b="1" dirty="0" smtClean="0">
+                <a:solidFill>
+                  <a:schemeClr val="accent5"/>
+                </a:solidFill>
+              </a:rPr>
+              <a:t> </a:t>
             </a:r>
             <a:r>
               <a:rPr lang="fr-FR" b="1" dirty="0" err="1" smtClean="0">
@@ -6011,7 +6007,7 @@
           <p:cNvPr id="3" name="Titre 2">
             <a:extLst>
               <a:ext uri="{FF2B5EF4-FFF2-40B4-BE49-F238E27FC236}">
-                <a16:creationId xmlns:a16="http://schemas.microsoft.com/office/drawing/2014/main" xmlns="" id="{3F03447C-16C5-4CBC-BC7C-C6B75433E15D}"/>
+                <a16:creationId xmlns="" xmlns:a16="http://schemas.microsoft.com/office/drawing/2014/main" id="{3F03447C-16C5-4CBC-BC7C-C6B75433E15D}"/>
               </a:ext>
             </a:extLst>
           </p:cNvPr>
@@ -6054,7 +6050,7 @@
           <p:cNvPr id="4" name="Tableau 3">
             <a:extLst>
               <a:ext uri="{FF2B5EF4-FFF2-40B4-BE49-F238E27FC236}">
-                <a16:creationId xmlns:a16="http://schemas.microsoft.com/office/drawing/2014/main" xmlns="" id="{55115E22-C5EE-4776-81BA-626B91DB99DB}"/>
+                <a16:creationId xmlns="" xmlns:a16="http://schemas.microsoft.com/office/drawing/2014/main" id="{55115E22-C5EE-4776-81BA-626B91DB99DB}"/>
               </a:ext>
             </a:extLst>
           </p:cNvPr>
@@ -6064,14 +6060,14 @@
           <p:nvPr>
             <p:extLst>
               <p:ext uri="{D42A27DB-BD31-4B8C-83A1-F6EECF244321}">
-                <p14:modId xmlns:p14="http://schemas.microsoft.com/office/powerpoint/2010/main" val="3734171981"/>
+                <p14:modId xmlns:p14="http://schemas.microsoft.com/office/powerpoint/2010/main" val="842860111"/>
               </p:ext>
             </p:extLst>
           </p:nvPr>
         </p:nvGraphicFramePr>
         <p:xfrm>
           <a:off x="453465" y="1106495"/>
-          <a:ext cx="9242626" cy="1273836"/>
+          <a:ext cx="9242626" cy="1261517"/>
         </p:xfrm>
         <a:graphic>
           <a:graphicData uri="http://schemas.openxmlformats.org/drawingml/2006/table">
@@ -6081,28 +6077,28 @@
                 <a:gridCol w="564452">
                   <a:extLst>
                     <a:ext uri="{9D8B030D-6E8A-4147-A177-3AD203B41FA5}">
-                      <a16:colId xmlns:a16="http://schemas.microsoft.com/office/drawing/2014/main" xmlns="" val="1282180568"/>
+                      <a16:colId xmlns="" xmlns:a16="http://schemas.microsoft.com/office/drawing/2014/main" val="1282180568"/>
                     </a:ext>
                   </a:extLst>
                 </a:gridCol>
                 <a:gridCol w="6478438">
                   <a:extLst>
                     <a:ext uri="{9D8B030D-6E8A-4147-A177-3AD203B41FA5}">
-                      <a16:colId xmlns:a16="http://schemas.microsoft.com/office/drawing/2014/main" xmlns="" val="151414170"/>
+                      <a16:colId xmlns="" xmlns:a16="http://schemas.microsoft.com/office/drawing/2014/main" val="151414170"/>
                     </a:ext>
                   </a:extLst>
                 </a:gridCol>
                 <a:gridCol w="1233577">
                   <a:extLst>
                     <a:ext uri="{9D8B030D-6E8A-4147-A177-3AD203B41FA5}">
-                      <a16:colId xmlns:a16="http://schemas.microsoft.com/office/drawing/2014/main" xmlns="" val="2960671948"/>
+                      <a16:colId xmlns="" xmlns:a16="http://schemas.microsoft.com/office/drawing/2014/main" val="2960671948"/>
                     </a:ext>
                   </a:extLst>
                 </a:gridCol>
                 <a:gridCol w="966159">
                   <a:extLst>
                     <a:ext uri="{9D8B030D-6E8A-4147-A177-3AD203B41FA5}">
-                      <a16:colId xmlns:a16="http://schemas.microsoft.com/office/drawing/2014/main" xmlns="" val="2450359460"/>
+                      <a16:colId xmlns="" xmlns:a16="http://schemas.microsoft.com/office/drawing/2014/main" val="2450359460"/>
                     </a:ext>
                   </a:extLst>
                 </a:gridCol>
@@ -6287,7 +6283,7 @@
                         </a:spcAft>
                       </a:pPr>
                       <a:r>
-                        <a:rPr lang="fr-FR" sz="1200" i="1" dirty="0">
+                        <a:rPr lang="fr-FR" sz="1200" i="1" dirty="0" err="1" smtClean="0">
                           <a:solidFill>
                             <a:schemeClr val="tx1"/>
                           </a:solidFill>
@@ -6296,7 +6292,7 @@
                           <a:ea typeface="Times New Roman" panose="02020603050405020304" pitchFamily="18" charset="0"/>
                           <a:cs typeface="Times New Roman" panose="02020603050405020304" pitchFamily="18" charset="0"/>
                         </a:rPr>
-                        <a:t>Exploitation</a:t>
+                        <a:t>var_h_exploitation</a:t>
                       </a:r>
                       <a:endParaRPr lang="fr-FR" sz="1500" dirty="0">
                         <a:solidFill>
@@ -6368,7 +6364,7 @@
                         </a:spcAft>
                       </a:pPr>
                       <a:r>
-                        <a:rPr lang="fr-FR" sz="1200" i="1">
+                        <a:rPr lang="fr-FR" sz="1200" i="1" dirty="0" err="1" smtClean="0">
                           <a:solidFill>
                             <a:schemeClr val="tx1"/>
                           </a:solidFill>
@@ -6377,9 +6373,9 @@
                           <a:ea typeface="Times New Roman" panose="02020603050405020304" pitchFamily="18" charset="0"/>
                           <a:cs typeface="Times New Roman" panose="02020603050405020304" pitchFamily="18" charset="0"/>
                         </a:rPr>
-                        <a:t>Impact</a:t>
+                        <a:t>var_h_impact</a:t>
                       </a:r>
-                      <a:endParaRPr lang="fr-FR" sz="1500">
+                      <a:endParaRPr lang="fr-FR" sz="1500" dirty="0">
                         <a:solidFill>
                           <a:schemeClr val="tx1"/>
                         </a:solidFill>
@@ -6434,7 +6430,7 @@
                 </a:tc>
                 <a:extLst>
                   <a:ext uri="{0D108BD9-81ED-4DB2-BD59-A6C34878D82A}">
-                    <a16:rowId xmlns:a16="http://schemas.microsoft.com/office/drawing/2014/main" xmlns="" val="2551652828"/>
+                    <a16:rowId xmlns="" xmlns:a16="http://schemas.microsoft.com/office/drawing/2014/main" val="2551652828"/>
                   </a:ext>
                 </a:extLst>
               </a:tr>
@@ -6623,7 +6619,7 @@
                 </a:tc>
                 <a:extLst>
                   <a:ext uri="{0D108BD9-81ED-4DB2-BD59-A6C34878D82A}">
-                    <a16:rowId xmlns:a16="http://schemas.microsoft.com/office/drawing/2014/main" xmlns="" val="2110200768"/>
+                    <a16:rowId xmlns="" xmlns:a16="http://schemas.microsoft.com/office/drawing/2014/main" val="2110200768"/>
                   </a:ext>
                 </a:extLst>
               </a:tr>
@@ -6651,7 +6647,7 @@
                         <a:defRPr/>
                       </a:pPr>
                       <a:r>
-                        <a:rPr lang="fr-FR" sz="1200" smtClean="0">
+                        <a:rPr lang="fr-FR" sz="1200" dirty="0" err="1" smtClean="0">
                           <a:solidFill>
                             <a:srgbClr val="263232"/>
                           </a:solidFill>
@@ -6662,6 +6658,15 @@
                         </a:rPr>
                         <a:t>var_d_description</a:t>
                       </a:r>
+                      <a:endParaRPr lang="fr-FR" sz="1200" dirty="0" smtClean="0">
+                        <a:solidFill>
+                          <a:srgbClr val="263232"/>
+                        </a:solidFill>
+                        <a:effectLst/>
+                        <a:latin typeface="Calibri" panose="020F0502020204030204" pitchFamily="34" charset="0"/>
+                        <a:ea typeface="Calibri" panose="020F0502020204030204" pitchFamily="34" charset="0"/>
+                        <a:cs typeface="Times New Roman" panose="02020603050405020304" pitchFamily="18" charset="0"/>
+                      </a:endParaRPr>
                     </a:p>
                   </a:txBody>
                   <a:tcPr marL="111137" marR="111137" marT="55569" marB="55569">
@@ -6735,7 +6740,7 @@
                 </a:tc>
                 <a:extLst>
                   <a:ext uri="{0D108BD9-81ED-4DB2-BD59-A6C34878D82A}">
-                    <a16:rowId xmlns:a16="http://schemas.microsoft.com/office/drawing/2014/main" xmlns="" val="1088236970"/>
+                    <a16:rowId xmlns="" xmlns:a16="http://schemas.microsoft.com/office/drawing/2014/main" val="1088236970"/>
                   </a:ext>
                 </a:extLst>
               </a:tr>
@@ -6748,7 +6753,7 @@
           <p:cNvPr id="6" name="ZoneTexte 5">
             <a:extLst>
               <a:ext uri="{FF2B5EF4-FFF2-40B4-BE49-F238E27FC236}">
-                <a16:creationId xmlns:a16="http://schemas.microsoft.com/office/drawing/2014/main" xmlns="" id="{C29B5C58-411F-4713-B096-7C8A610D2436}"/>
+                <a16:creationId xmlns="" xmlns:a16="http://schemas.microsoft.com/office/drawing/2014/main" id="{C29B5C58-411F-4713-B096-7C8A610D2436}"/>
               </a:ext>
             </a:extLst>
           </p:cNvPr>
@@ -6758,7 +6763,7 @@
         <p:spPr>
           <a:xfrm>
             <a:off x="453465" y="5926347"/>
-            <a:ext cx="4035272" cy="369332"/>
+            <a:ext cx="2681760" cy="369332"/>
           </a:xfrm>
           <a:prstGeom prst="rect">
             <a:avLst/>
@@ -6772,7 +6777,7 @@
           <a:lstStyle/>
           <a:p>
             <a:r>
-              <a:rPr lang="fr-FR" b="1" dirty="0">
+              <a:rPr lang="fr-FR" b="1" dirty="0" smtClean="0">
                 <a:solidFill>
                   <a:schemeClr val="accent5"/>
                 </a:solidFill>
@@ -6781,20 +6786,20 @@
               <a:t></a:t>
             </a:r>
             <a:r>
-              <a:rPr lang="fr-FR" b="1" dirty="0">
-                <a:solidFill>
-                  <a:schemeClr val="accent5"/>
-                </a:solidFill>
-              </a:rPr>
-              <a:t>Action corrective </a:t>
-            </a:r>
-            <a:r>
               <a:rPr lang="fr-FR" b="1" dirty="0" err="1" smtClean="0">
                 <a:solidFill>
                   <a:schemeClr val="accent5"/>
                 </a:solidFill>
               </a:rPr>
-              <a:t>var_c_id</a:t>
+              <a:t>Fix</a:t>
+            </a:r>
+            <a:r>
+              <a:rPr lang="fr-FR" b="1" smtClean="0">
+                <a:solidFill>
+                  <a:schemeClr val="accent5"/>
+                </a:solidFill>
+              </a:rPr>
+              <a:t> var_c_id</a:t>
             </a:r>
             <a:r>
               <a:rPr lang="fr-FR" b="1" dirty="0" smtClean="0">

</xml_diff>